<commit_message>
Still having trouble getting the beam collimated
</commit_message>
<xml_diff>
--- a/06-22-21_Meeting.pptx
+++ b/06-22-21_Meeting.pptx
@@ -197,6 +197,9 @@
         </p14:section>
       </p14:sectionLst>
     </p:ext>
+    <p:ext uri="{EFAFB233-063F-42B5-8137-9DF3F51BA10A}">
+      <p15:sldGuideLst xmlns:p15="http://schemas.microsoft.com/office/powerpoint/2012/main"/>
+    </p:ext>
   </p:extLst>
 </p:presentation>
 </file>
@@ -348,7 +351,7 @@
           <a:p>
             <a:fld id="{2EC55167-16AD-423D-AB05-BAA91F67A9B2}" type="datetimeFigureOut">
               <a:rPr lang="zh-CN" altLang="en-US" smtClean="0"/>
-              <a:t>2021/6/22</a:t>
+              <a:t>2021/6/23</a:t>
             </a:fld>
             <a:endParaRPr lang="zh-CN" altLang="en-US"/>
           </a:p>
@@ -546,7 +549,7 @@
           <a:p>
             <a:fld id="{2EC55167-16AD-423D-AB05-BAA91F67A9B2}" type="datetimeFigureOut">
               <a:rPr lang="zh-CN" altLang="en-US" smtClean="0"/>
-              <a:t>2021/6/22</a:t>
+              <a:t>2021/6/23</a:t>
             </a:fld>
             <a:endParaRPr lang="zh-CN" altLang="en-US"/>
           </a:p>
@@ -754,7 +757,7 @@
           <a:p>
             <a:fld id="{2EC55167-16AD-423D-AB05-BAA91F67A9B2}" type="datetimeFigureOut">
               <a:rPr lang="zh-CN" altLang="en-US" smtClean="0"/>
-              <a:t>2021/6/22</a:t>
+              <a:t>2021/6/23</a:t>
             </a:fld>
             <a:endParaRPr lang="zh-CN" altLang="en-US"/>
           </a:p>
@@ -952,7 +955,7 @@
           <a:p>
             <a:fld id="{2EC55167-16AD-423D-AB05-BAA91F67A9B2}" type="datetimeFigureOut">
               <a:rPr lang="zh-CN" altLang="en-US" smtClean="0"/>
-              <a:t>2021/6/22</a:t>
+              <a:t>2021/6/23</a:t>
             </a:fld>
             <a:endParaRPr lang="zh-CN" altLang="en-US"/>
           </a:p>
@@ -1227,7 +1230,7 @@
           <a:p>
             <a:fld id="{2EC55167-16AD-423D-AB05-BAA91F67A9B2}" type="datetimeFigureOut">
               <a:rPr lang="zh-CN" altLang="en-US" smtClean="0"/>
-              <a:t>2021/6/22</a:t>
+              <a:t>2021/6/23</a:t>
             </a:fld>
             <a:endParaRPr lang="zh-CN" altLang="en-US"/>
           </a:p>
@@ -1492,7 +1495,7 @@
           <a:p>
             <a:fld id="{2EC55167-16AD-423D-AB05-BAA91F67A9B2}" type="datetimeFigureOut">
               <a:rPr lang="zh-CN" altLang="en-US" smtClean="0"/>
-              <a:t>2021/6/22</a:t>
+              <a:t>2021/6/23</a:t>
             </a:fld>
             <a:endParaRPr lang="zh-CN" altLang="en-US"/>
           </a:p>
@@ -1904,7 +1907,7 @@
           <a:p>
             <a:fld id="{2EC55167-16AD-423D-AB05-BAA91F67A9B2}" type="datetimeFigureOut">
               <a:rPr lang="zh-CN" altLang="en-US" smtClean="0"/>
-              <a:t>2021/6/22</a:t>
+              <a:t>2021/6/23</a:t>
             </a:fld>
             <a:endParaRPr lang="zh-CN" altLang="en-US"/>
           </a:p>
@@ -2045,7 +2048,7 @@
           <a:p>
             <a:fld id="{2EC55167-16AD-423D-AB05-BAA91F67A9B2}" type="datetimeFigureOut">
               <a:rPr lang="zh-CN" altLang="en-US" smtClean="0"/>
-              <a:t>2021/6/22</a:t>
+              <a:t>2021/6/23</a:t>
             </a:fld>
             <a:endParaRPr lang="zh-CN" altLang="en-US"/>
           </a:p>
@@ -2158,7 +2161,7 @@
           <a:p>
             <a:fld id="{2EC55167-16AD-423D-AB05-BAA91F67A9B2}" type="datetimeFigureOut">
               <a:rPr lang="zh-CN" altLang="en-US" smtClean="0"/>
-              <a:t>2021/6/22</a:t>
+              <a:t>2021/6/23</a:t>
             </a:fld>
             <a:endParaRPr lang="zh-CN" altLang="en-US"/>
           </a:p>
@@ -2469,7 +2472,7 @@
           <a:p>
             <a:fld id="{2EC55167-16AD-423D-AB05-BAA91F67A9B2}" type="datetimeFigureOut">
               <a:rPr lang="zh-CN" altLang="en-US" smtClean="0"/>
-              <a:t>2021/6/22</a:t>
+              <a:t>2021/6/23</a:t>
             </a:fld>
             <a:endParaRPr lang="zh-CN" altLang="en-US"/>
           </a:p>
@@ -2757,7 +2760,7 @@
           <a:p>
             <a:fld id="{2EC55167-16AD-423D-AB05-BAA91F67A9B2}" type="datetimeFigureOut">
               <a:rPr lang="zh-CN" altLang="en-US" smtClean="0"/>
-              <a:t>2021/6/22</a:t>
+              <a:t>2021/6/23</a:t>
             </a:fld>
             <a:endParaRPr lang="zh-CN" altLang="en-US"/>
           </a:p>
@@ -2998,7 +3001,7 @@
           <a:p>
             <a:fld id="{2EC55167-16AD-423D-AB05-BAA91F67A9B2}" type="datetimeFigureOut">
               <a:rPr lang="zh-CN" altLang="en-US" smtClean="0"/>
-              <a:t>2021/6/22</a:t>
+              <a:t>2021/6/23</a:t>
             </a:fld>
             <a:endParaRPr lang="zh-CN" altLang="en-US"/>
           </a:p>
@@ -5723,8 +5726,8 @@
         </p:blipFill>
         <p:spPr>
           <a:xfrm>
-            <a:off x="838200" y="1631958"/>
-            <a:ext cx="10515599" cy="2389908"/>
+            <a:off x="838201" y="1631958"/>
+            <a:ext cx="10515596" cy="2389908"/>
           </a:xfrm>
         </p:spPr>
       </p:pic>
@@ -5774,50 +5777,6 @@
               <a:rPr lang="en-US" altLang="zh-CN" dirty="0"/>
               <a:t> by a factor of 2 for HHLM2</a:t>
             </a:r>
-          </a:p>
-        </p:txBody>
-      </p:sp>
-      <p:sp>
-        <p:nvSpPr>
-          <p:cNvPr id="3" name="文本框 2">
-            <a:extLst>
-              <a:ext uri="{FF2B5EF4-FFF2-40B4-BE49-F238E27FC236}">
-                <a16:creationId xmlns:a16="http://schemas.microsoft.com/office/drawing/2014/main" id="{185D60B1-25A3-4A07-A4AE-D113AD6DC8A4}"/>
-              </a:ext>
-            </a:extLst>
-          </p:cNvPr>
-          <p:cNvSpPr txBox="1"/>
-          <p:nvPr/>
-        </p:nvSpPr>
-        <p:spPr>
-          <a:xfrm>
-            <a:off x="1299884" y="2197226"/>
-            <a:ext cx="5164566" cy="369332"/>
-          </a:xfrm>
-          <a:prstGeom prst="rect">
-            <a:avLst/>
-          </a:prstGeom>
-          <a:noFill/>
-        </p:spPr>
-        <p:txBody>
-          <a:bodyPr wrap="square" rtlCol="0">
-            <a:spAutoFit/>
-          </a:bodyPr>
-          <a:lstStyle/>
-          <a:p>
-            <a:r>
-              <a:rPr lang="en-US" altLang="zh-CN" dirty="0">
-                <a:solidFill>
-                  <a:srgbClr val="FF0000"/>
-                </a:solidFill>
-              </a:rPr>
-              <a:t>Plot to be updated</a:t>
-            </a:r>
-            <a:endParaRPr lang="zh-CN" altLang="en-US" dirty="0">
-              <a:solidFill>
-                <a:srgbClr val="FF0000"/>
-              </a:solidFill>
-            </a:endParaRPr>
           </a:p>
         </p:txBody>
       </p:sp>

</xml_diff>